<commit_message>
added major state space changes
</commit_message>
<xml_diff>
--- a/references/StateSpace.pptx
+++ b/references/StateSpace.pptx
@@ -4370,6 +4370,93 @@
           <a:xfrm>
             <a:off x="502663" y="3385908"/>
             <a:ext cx="1385739" cy="923330"/>
+          </a:xfrm>
+          <a:prstGeom prst="rect">
+            <a:avLst/>
+          </a:prstGeom>
+          <a:noFill/>
+        </p:spPr>
+        <p:txBody>
+          <a:bodyPr wrap="square" rtlCol="0">
+            <a:spAutoFit/>
+          </a:bodyPr>
+          <a:lstStyle/>
+          <a:p>
+            <a:r>
+              <a:rPr lang="en-US" b="1" dirty="0"/>
+              <a:t>Detected</a:t>
+            </a:r>
+            <a:r>
+              <a:rPr lang="en-US" dirty="0"/>
+              <a:t> Downed Survivor</a:t>
+            </a:r>
+          </a:p>
+        </p:txBody>
+      </p:sp>
+      <p:cxnSp>
+        <p:nvCxnSpPr>
+          <p:cNvPr id="12" name="Connector: Curved 11">
+            <a:extLst>
+              <a:ext uri="{FF2B5EF4-FFF2-40B4-BE49-F238E27FC236}">
+                <a16:creationId xmlns:a16="http://schemas.microsoft.com/office/drawing/2014/main" id="{7B76720F-9512-9098-BCCB-D2E1DFA3C00E}"/>
+              </a:ext>
+            </a:extLst>
+          </p:cNvPr>
+          <p:cNvCxnSpPr>
+            <a:cxnSpLocks/>
+            <a:stCxn id="3" idx="0"/>
+            <a:endCxn id="3" idx="7"/>
+          </p:cNvCxnSpPr>
+          <p:nvPr/>
+        </p:nvCxnSpPr>
+        <p:spPr>
+          <a:xfrm rot="16200000" flipH="1">
+            <a:off x="10049923" y="1041280"/>
+            <a:ext cx="219996" cy="560808"/>
+          </a:xfrm>
+          <a:prstGeom prst="curvedConnector3">
+            <a:avLst>
+              <a:gd name="adj1" fmla="val -323279"/>
+            </a:avLst>
+          </a:prstGeom>
+          <a:ln w="38100">
+            <a:solidFill>
+              <a:schemeClr val="tx1"/>
+            </a:solidFill>
+            <a:tailEnd type="triangle"/>
+          </a:ln>
+        </p:spPr>
+        <p:style>
+          <a:lnRef idx="2">
+            <a:schemeClr val="accent1"/>
+          </a:lnRef>
+          <a:fillRef idx="0">
+            <a:schemeClr val="accent1"/>
+          </a:fillRef>
+          <a:effectRef idx="1">
+            <a:schemeClr val="accent1"/>
+          </a:effectRef>
+          <a:fontRef idx="minor">
+            <a:schemeClr val="tx1"/>
+          </a:fontRef>
+        </p:style>
+      </p:cxnSp>
+      <p:sp>
+        <p:nvSpPr>
+          <p:cNvPr id="21" name="TextBox 20">
+            <a:extLst>
+              <a:ext uri="{FF2B5EF4-FFF2-40B4-BE49-F238E27FC236}">
+                <a16:creationId xmlns:a16="http://schemas.microsoft.com/office/drawing/2014/main" id="{1886EFA5-2A69-1B9C-9AA0-23B67C91D619}"/>
+              </a:ext>
+            </a:extLst>
+          </p:cNvPr>
+          <p:cNvSpPr txBox="1"/>
+          <p:nvPr/>
+        </p:nvSpPr>
+        <p:spPr>
+          <a:xfrm>
+            <a:off x="8908518" y="135366"/>
+            <a:ext cx="1265108" cy="937413"/>
           </a:xfrm>
           <a:prstGeom prst="rect">
             <a:avLst/>

</xml_diff>